<commit_message>
prepare slides for ggplot2
</commit_message>
<xml_diff>
--- a/ex/03_manipulating_data.pptx
+++ b/ex/03_manipulating_data.pptx
@@ -348,7 +348,7 @@
           <a:p>
             <a:fld id="{5FCDCD17-B0B1-A244-9BB5-D7228F76BED7}" type="datetime3">
               <a:rPr lang="en-SG" smtClean="0"/>
-              <a:t>6 March 2023</a:t>
+              <a:t>24 March 2023</a:t>
             </a:fld>
             <a:endParaRPr lang="en-US" dirty="0"/>
           </a:p>
@@ -716,7 +716,7 @@
           <a:p>
             <a:fld id="{ADD28603-00EC-3A4D-B44A-BEF0A0F382C6}" type="datetime3">
               <a:rPr lang="en-SG" smtClean="0"/>
-              <a:t>6 March 2023</a:t>
+              <a:t>24 March 2023</a:t>
             </a:fld>
             <a:endParaRPr lang="en-US"/>
           </a:p>
@@ -1114,7 +1114,7 @@
           <a:p>
             <a:fld id="{E6645DC1-DD2E-5147-813A-145518F6A88E}" type="datetime3">
               <a:rPr lang="en-SG" smtClean="0"/>
-              <a:t>6 March 2023</a:t>
+              <a:t>24 March 2023</a:t>
             </a:fld>
             <a:endParaRPr lang="en-US"/>
           </a:p>
@@ -1415,7 +1415,7 @@
           <a:p>
             <a:fld id="{9CE5D27D-0906-C849-85EF-1698976BF415}" type="datetime3">
               <a:rPr lang="en-SG" smtClean="0"/>
-              <a:t>6 March 2023</a:t>
+              <a:t>24 March 2023</a:t>
             </a:fld>
             <a:endParaRPr lang="en-US"/>
           </a:p>
@@ -1993,7 +1993,7 @@
           <a:p>
             <a:fld id="{B644A007-AED7-CC4E-A6C9-9429041AE4C9}" type="datetime3">
               <a:rPr lang="en-SG" smtClean="0"/>
-              <a:t>6 March 2023</a:t>
+              <a:t>24 March 2023</a:t>
             </a:fld>
             <a:endParaRPr lang="en-US"/>
           </a:p>
@@ -2401,7 +2401,7 @@
           <a:p>
             <a:fld id="{06911E40-0033-E74E-A93D-D0B3F4840C2B}" type="datetime3">
               <a:rPr lang="en-SG" smtClean="0"/>
-              <a:t>6 March 2023</a:t>
+              <a:t>24 March 2023</a:t>
             </a:fld>
             <a:endParaRPr lang="en-US"/>
           </a:p>
@@ -2614,7 +2614,7 @@
           <a:p>
             <a:fld id="{FDD5ADF8-FB30-A140-BC76-B82B3346A618}" type="datetime3">
               <a:rPr lang="en-SG" smtClean="0"/>
-              <a:t>6 March 2023</a:t>
+              <a:t>24 March 2023</a:t>
             </a:fld>
             <a:endParaRPr lang="en-US"/>
           </a:p>
@@ -2957,7 +2957,7 @@
           <a:p>
             <a:fld id="{2EF13291-2998-1E45-BB6C-14491E304C83}" type="datetime3">
               <a:rPr lang="en-SG" smtClean="0"/>
-              <a:t>6 March 2023</a:t>
+              <a:t>24 March 2023</a:t>
             </a:fld>
             <a:endParaRPr lang="en-US"/>
           </a:p>
@@ -3276,7 +3276,7 @@
           <a:p>
             <a:fld id="{7BDC71DE-80FC-B640-A19E-6715081E17F0}" type="datetime3">
               <a:rPr lang="en-SG" smtClean="0"/>
-              <a:t>6 March 2023</a:t>
+              <a:t>24 March 2023</a:t>
             </a:fld>
             <a:endParaRPr lang="en-US"/>
           </a:p>
@@ -3551,7 +3551,7 @@
           <a:p>
             <a:fld id="{39E2CDA4-D7DD-D048-900A-DFEB5E81218B}" type="datetime3">
               <a:rPr lang="en-SG" smtClean="0"/>
-              <a:t>6 March 2023</a:t>
+              <a:t>24 March 2023</a:t>
             </a:fld>
             <a:endParaRPr lang="en-US" dirty="0"/>
           </a:p>
@@ -4020,15 +4020,13 @@
               <a:buNone/>
             </a:pPr>
             <a:r>
-              <a:rPr dirty="0"/>
-              <a:t>R </a:t>
-            </a:r>
-            <a:r>
-              <a:rPr dirty="0" err="1"/>
-              <a:t>Clud</a:t>
-            </a:r>
-            <a:r>
-              <a:rPr dirty="0"/>
+              <a:t>R Clu</a:t>
+            </a:r>
+            <a:r>
+              <a:rPr lang="en-US"/>
+              <a:t>b</a:t>
+            </a:r>
+            <a:r>
               <a:t>: </a:t>
             </a:r>
             <a:r>

</xml_diff>